<commit_message>
Added scaling and textbox input support.
</commit_message>
<xml_diff>
--- a/preview/TIFFAlign_preview.pptx
+++ b/preview/TIFFAlign_preview.pptx
@@ -243,7 +243,7 @@
           <a:p>
             <a:fld id="{B2B9CDFC-DE88-FC46-9980-4DF0E89A0448}" type="datetimeFigureOut">
               <a:rPr lang="en-US" smtClean="0"/>
-              <a:t>9/10/25</a:t>
+              <a:t>9/11/25</a:t>
             </a:fld>
             <a:endParaRPr lang="en-US"/>
           </a:p>
@@ -413,7 +413,7 @@
           <a:p>
             <a:fld id="{B2B9CDFC-DE88-FC46-9980-4DF0E89A0448}" type="datetimeFigureOut">
               <a:rPr lang="en-US" smtClean="0"/>
-              <a:t>9/10/25</a:t>
+              <a:t>9/11/25</a:t>
             </a:fld>
             <a:endParaRPr lang="en-US"/>
           </a:p>
@@ -593,7 +593,7 @@
           <a:p>
             <a:fld id="{B2B9CDFC-DE88-FC46-9980-4DF0E89A0448}" type="datetimeFigureOut">
               <a:rPr lang="en-US" smtClean="0"/>
-              <a:t>9/10/25</a:t>
+              <a:t>9/11/25</a:t>
             </a:fld>
             <a:endParaRPr lang="en-US"/>
           </a:p>
@@ -763,7 +763,7 @@
           <a:p>
             <a:fld id="{B2B9CDFC-DE88-FC46-9980-4DF0E89A0448}" type="datetimeFigureOut">
               <a:rPr lang="en-US" smtClean="0"/>
-              <a:t>9/10/25</a:t>
+              <a:t>9/11/25</a:t>
             </a:fld>
             <a:endParaRPr lang="en-US"/>
           </a:p>
@@ -1009,7 +1009,7 @@
           <a:p>
             <a:fld id="{B2B9CDFC-DE88-FC46-9980-4DF0E89A0448}" type="datetimeFigureOut">
               <a:rPr lang="en-US" smtClean="0"/>
-              <a:t>9/10/25</a:t>
+              <a:t>9/11/25</a:t>
             </a:fld>
             <a:endParaRPr lang="en-US"/>
           </a:p>
@@ -1241,7 +1241,7 @@
           <a:p>
             <a:fld id="{B2B9CDFC-DE88-FC46-9980-4DF0E89A0448}" type="datetimeFigureOut">
               <a:rPr lang="en-US" smtClean="0"/>
-              <a:t>9/10/25</a:t>
+              <a:t>9/11/25</a:t>
             </a:fld>
             <a:endParaRPr lang="en-US"/>
           </a:p>
@@ -1608,7 +1608,7 @@
           <a:p>
             <a:fld id="{B2B9CDFC-DE88-FC46-9980-4DF0E89A0448}" type="datetimeFigureOut">
               <a:rPr lang="en-US" smtClean="0"/>
-              <a:t>9/10/25</a:t>
+              <a:t>9/11/25</a:t>
             </a:fld>
             <a:endParaRPr lang="en-US"/>
           </a:p>
@@ -1726,7 +1726,7 @@
           <a:p>
             <a:fld id="{B2B9CDFC-DE88-FC46-9980-4DF0E89A0448}" type="datetimeFigureOut">
               <a:rPr lang="en-US" smtClean="0"/>
-              <a:t>9/10/25</a:t>
+              <a:t>9/11/25</a:t>
             </a:fld>
             <a:endParaRPr lang="en-US"/>
           </a:p>
@@ -1821,7 +1821,7 @@
           <a:p>
             <a:fld id="{B2B9CDFC-DE88-FC46-9980-4DF0E89A0448}" type="datetimeFigureOut">
               <a:rPr lang="en-US" smtClean="0"/>
-              <a:t>9/10/25</a:t>
+              <a:t>9/11/25</a:t>
             </a:fld>
             <a:endParaRPr lang="en-US"/>
           </a:p>
@@ -2098,7 +2098,7 @@
           <a:p>
             <a:fld id="{B2B9CDFC-DE88-FC46-9980-4DF0E89A0448}" type="datetimeFigureOut">
               <a:rPr lang="en-US" smtClean="0"/>
-              <a:t>9/10/25</a:t>
+              <a:t>9/11/25</a:t>
             </a:fld>
             <a:endParaRPr lang="en-US"/>
           </a:p>
@@ -2355,7 +2355,7 @@
           <a:p>
             <a:fld id="{B2B9CDFC-DE88-FC46-9980-4DF0E89A0448}" type="datetimeFigureOut">
               <a:rPr lang="en-US" smtClean="0"/>
-              <a:t>9/10/25</a:t>
+              <a:t>9/11/25</a:t>
             </a:fld>
             <a:endParaRPr lang="en-US"/>
           </a:p>
@@ -2568,7 +2568,7 @@
           <a:p>
             <a:fld id="{B2B9CDFC-DE88-FC46-9980-4DF0E89A0448}" type="datetimeFigureOut">
               <a:rPr lang="en-US" smtClean="0"/>
-              <a:t>9/10/25</a:t>
+              <a:t>9/11/25</a:t>
             </a:fld>
             <a:endParaRPr lang="en-US"/>
           </a:p>
@@ -3077,13 +3077,13 @@
         </p:nvPicPr>
         <p:blipFill rotWithShape="1">
           <a:blip r:embed="rId2"/>
-          <a:srcRect b="36336"/>
+          <a:srcRect l="-491" t="2686" r="491" b="33651"/>
           <a:stretch/>
         </p:blipFill>
         <p:spPr>
           <a:xfrm>
-            <a:off x="0" y="0"/>
-            <a:ext cx="2732512" cy="2303463"/>
+            <a:off x="72000" y="57600"/>
+            <a:ext cx="2664183" cy="2245863"/>
           </a:xfrm>
           <a:prstGeom prst="rect">
             <a:avLst/>

</xml_diff>

<commit_message>
Added automatic alignment features
</commit_message>
<xml_diff>
--- a/preview/TIFFAlign_preview.pptx
+++ b/preview/TIFFAlign_preview.pptx
@@ -243,7 +243,7 @@
           <a:p>
             <a:fld id="{B2B9CDFC-DE88-FC46-9980-4DF0E89A0448}" type="datetimeFigureOut">
               <a:rPr lang="en-US" smtClean="0"/>
-              <a:t>9/11/25</a:t>
+              <a:t>9/15/25</a:t>
             </a:fld>
             <a:endParaRPr lang="en-US"/>
           </a:p>
@@ -413,7 +413,7 @@
           <a:p>
             <a:fld id="{B2B9CDFC-DE88-FC46-9980-4DF0E89A0448}" type="datetimeFigureOut">
               <a:rPr lang="en-US" smtClean="0"/>
-              <a:t>9/11/25</a:t>
+              <a:t>9/15/25</a:t>
             </a:fld>
             <a:endParaRPr lang="en-US"/>
           </a:p>
@@ -593,7 +593,7 @@
           <a:p>
             <a:fld id="{B2B9CDFC-DE88-FC46-9980-4DF0E89A0448}" type="datetimeFigureOut">
               <a:rPr lang="en-US" smtClean="0"/>
-              <a:t>9/11/25</a:t>
+              <a:t>9/15/25</a:t>
             </a:fld>
             <a:endParaRPr lang="en-US"/>
           </a:p>
@@ -763,7 +763,7 @@
           <a:p>
             <a:fld id="{B2B9CDFC-DE88-FC46-9980-4DF0E89A0448}" type="datetimeFigureOut">
               <a:rPr lang="en-US" smtClean="0"/>
-              <a:t>9/11/25</a:t>
+              <a:t>9/15/25</a:t>
             </a:fld>
             <a:endParaRPr lang="en-US"/>
           </a:p>
@@ -1009,7 +1009,7 @@
           <a:p>
             <a:fld id="{B2B9CDFC-DE88-FC46-9980-4DF0E89A0448}" type="datetimeFigureOut">
               <a:rPr lang="en-US" smtClean="0"/>
-              <a:t>9/11/25</a:t>
+              <a:t>9/15/25</a:t>
             </a:fld>
             <a:endParaRPr lang="en-US"/>
           </a:p>
@@ -1241,7 +1241,7 @@
           <a:p>
             <a:fld id="{B2B9CDFC-DE88-FC46-9980-4DF0E89A0448}" type="datetimeFigureOut">
               <a:rPr lang="en-US" smtClean="0"/>
-              <a:t>9/11/25</a:t>
+              <a:t>9/15/25</a:t>
             </a:fld>
             <a:endParaRPr lang="en-US"/>
           </a:p>
@@ -1608,7 +1608,7 @@
           <a:p>
             <a:fld id="{B2B9CDFC-DE88-FC46-9980-4DF0E89A0448}" type="datetimeFigureOut">
               <a:rPr lang="en-US" smtClean="0"/>
-              <a:t>9/11/25</a:t>
+              <a:t>9/15/25</a:t>
             </a:fld>
             <a:endParaRPr lang="en-US"/>
           </a:p>
@@ -1726,7 +1726,7 @@
           <a:p>
             <a:fld id="{B2B9CDFC-DE88-FC46-9980-4DF0E89A0448}" type="datetimeFigureOut">
               <a:rPr lang="en-US" smtClean="0"/>
-              <a:t>9/11/25</a:t>
+              <a:t>9/15/25</a:t>
             </a:fld>
             <a:endParaRPr lang="en-US"/>
           </a:p>
@@ -1821,7 +1821,7 @@
           <a:p>
             <a:fld id="{B2B9CDFC-DE88-FC46-9980-4DF0E89A0448}" type="datetimeFigureOut">
               <a:rPr lang="en-US" smtClean="0"/>
-              <a:t>9/11/25</a:t>
+              <a:t>9/15/25</a:t>
             </a:fld>
             <a:endParaRPr lang="en-US"/>
           </a:p>
@@ -2098,7 +2098,7 @@
           <a:p>
             <a:fld id="{B2B9CDFC-DE88-FC46-9980-4DF0E89A0448}" type="datetimeFigureOut">
               <a:rPr lang="en-US" smtClean="0"/>
-              <a:t>9/11/25</a:t>
+              <a:t>9/15/25</a:t>
             </a:fld>
             <a:endParaRPr lang="en-US"/>
           </a:p>
@@ -2355,7 +2355,7 @@
           <a:p>
             <a:fld id="{B2B9CDFC-DE88-FC46-9980-4DF0E89A0448}" type="datetimeFigureOut">
               <a:rPr lang="en-US" smtClean="0"/>
-              <a:t>9/11/25</a:t>
+              <a:t>9/15/25</a:t>
             </a:fld>
             <a:endParaRPr lang="en-US"/>
           </a:p>
@@ -2568,7 +2568,7 @@
           <a:p>
             <a:fld id="{B2B9CDFC-DE88-FC46-9980-4DF0E89A0448}" type="datetimeFigureOut">
               <a:rPr lang="en-US" smtClean="0"/>
-              <a:t>9/11/25</a:t>
+              <a:t>9/15/25</a:t>
             </a:fld>
             <a:endParaRPr lang="en-US"/>
           </a:p>
@@ -2987,8 +2987,8 @@
         </p:nvSpPr>
         <p:spPr>
           <a:xfrm>
-            <a:off x="2672685" y="1056026"/>
-            <a:ext cx="1738857" cy="338554"/>
+            <a:off x="2632676" y="1087165"/>
+            <a:ext cx="2144115" cy="323165"/>
           </a:xfrm>
           <a:prstGeom prst="rect">
             <a:avLst/>
@@ -3002,16 +3002,16 @@
           <a:lstStyle/>
           <a:p>
             <a:r>
-              <a:rPr lang="en-CA" sz="800" b="0" i="0" dirty="0">
+              <a:rPr lang="en-CA" sz="750" b="0" i="0" dirty="0">
                 <a:solidFill>
                   <a:srgbClr val="F0F6FC"/>
                 </a:solidFill>
                 <a:effectLst/>
                 <a:latin typeface="Franklin Gothic Medium" panose="020B0603020102020204" pitchFamily="34" charset="0"/>
               </a:rPr>
-              <a:t>A simple GUI for manual alignment across calcium imaging sessions</a:t>
-            </a:r>
-            <a:endParaRPr lang="en-US" sz="800" dirty="0">
+              <a:t>A simple GUI for automatic and manual alignment across calcium imaging sessions</a:t>
+            </a:r>
+            <a:endParaRPr lang="en-US" sz="750" dirty="0">
               <a:latin typeface="Franklin Gothic Medium" panose="020B0603020102020204" pitchFamily="34" charset="0"/>
             </a:endParaRPr>
           </a:p>
@@ -3031,7 +3031,7 @@
         </p:nvSpPr>
         <p:spPr>
           <a:xfrm>
-            <a:off x="2662175" y="751260"/>
+            <a:off x="2622167" y="782399"/>
             <a:ext cx="2304000" cy="369332"/>
           </a:xfrm>
           <a:prstGeom prst="rect">
@@ -3077,12 +3077,12 @@
         </p:nvPicPr>
         <p:blipFill rotWithShape="1">
           <a:blip r:embed="rId2"/>
-          <a:srcRect l="-491" t="2686" r="491" b="33651"/>
+          <a:srcRect l="-405" t="1912" r="405" b="23534"/>
           <a:stretch/>
         </p:blipFill>
         <p:spPr>
           <a:xfrm>
-            <a:off x="72000" y="57600"/>
+            <a:off x="0" y="57600"/>
             <a:ext cx="2664183" cy="2245863"/>
           </a:xfrm>
           <a:prstGeom prst="rect">

</xml_diff>